<commit_message>
Adding updates for API key
</commit_message>
<xml_diff>
--- a/ClassMaterials/Week3/Week3.pptx
+++ b/ClassMaterials/Week3/Week3.pptx
@@ -239,7 +239,7 @@
           <a:p>
             <a:fld id="{4556A2EE-B5F6-484E-BC83-5FA03CF24537}" type="datetimeFigureOut">
               <a:rPr lang="en-US" smtClean="0"/>
-              <a:t>9/23/2025</a:t>
+              <a:t>9/24/2025</a:t>
             </a:fld>
             <a:endParaRPr lang="en-US"/>
           </a:p>
@@ -739,7 +739,10 @@
           <a:bodyPr/>
           <a:lstStyle/>
           <a:p>
-            <a:endParaRPr lang="en-US" dirty="0"/>
+            <a:r>
+              <a:rPr lang="en-US" dirty="0"/>
+              <a:t>First – each model will behave slightly differently. Not much we can do there.</a:t>
+            </a:r>
           </a:p>
         </p:txBody>
       </p:sp>
@@ -4666,12 +4669,14 @@
         </p:nvSpPr>
         <p:spPr/>
         <p:txBody>
-          <a:bodyPr/>
+          <a:bodyPr>
+            <a:normAutofit/>
+          </a:bodyPr>
           <a:lstStyle/>
           <a:p>
             <a:r>
               <a:rPr lang="en-US" dirty="0"/>
-              <a:t>Probably what you use most</a:t>
+              <a:t>Probably what you use most when writing code</a:t>
             </a:r>
           </a:p>
           <a:p>
@@ -4696,7 +4701,10 @@
             <a:endParaRPr lang="en-US" dirty="0"/>
           </a:p>
           <a:p>
-            <a:endParaRPr lang="en-US" dirty="0"/>
+            <a:r>
+              <a:rPr lang="en-US" dirty="0"/>
+              <a:t>Doesn’t work for putting code into a programmatic tool</a:t>
+            </a:r>
           </a:p>
           <a:p>
             <a:endParaRPr lang="en-US" dirty="0"/>
@@ -4865,7 +4873,7 @@
           <a:p>
             <a:r>
               <a:rPr lang="en-US" dirty="0"/>
-              <a:t>How do we know to do this? Prompt Engineering!</a:t>
+              <a:t>How do we know how to do this? Prompt Engineering!</a:t>
             </a:r>
           </a:p>
         </p:txBody>
@@ -5363,15 +5371,6 @@
           <a:solidFill>
             <a:srgbClr val="FFFFFF"/>
           </a:solidFill>
-          <a:extLst>
-            <a:ext uri="{909E8E84-426E-40DD-AFC4-6F175D3DCCD1}">
-              <a14:hiddenFill xmlns:a14="http://schemas.microsoft.com/office/drawing/2010/main">
-                <a:solidFill>
-                  <a:srgbClr val="FFFFFF"/>
-                </a:solidFill>
-              </a14:hiddenFill>
-            </a:ext>
-          </a:extLst>
         </p:spPr>
       </p:pic>
       <p:sp>
@@ -6714,6 +6713,7 @@
             <a:endParaRPr lang="en-US" dirty="0"/>
           </a:p>
           <a:p>
+            <a:pPr lvl="1"/>
             <a:r>
               <a:rPr lang="en-US" dirty="0"/>
               <a:t>Anything fairly standard and repetitive</a:t>
@@ -6846,7 +6846,7 @@
             </a:r>
             <a:r>
               <a:rPr lang="en-US" dirty="0"/>
-              <a:t> (notice it now has a Captcha?)</a:t>
+              <a:t> (notice it now has a Captcha at times?)</a:t>
             </a:r>
           </a:p>
           <a:p>
@@ -6969,7 +6969,7 @@
           <a:p>
             <a:r>
               <a:rPr lang="en-US" dirty="0"/>
-              <a:t>No… not at all.</a:t>
+              <a:t>No… not at all….</a:t>
             </a:r>
           </a:p>
           <a:p>
@@ -6978,7 +6978,7 @@
           <a:p>
             <a:r>
               <a:rPr lang="en-US" dirty="0"/>
-              <a:t>Here’s an example…</a:t>
+              <a:t>Let’s look at an example</a:t>
             </a:r>
           </a:p>
         </p:txBody>

</xml_diff>